<commit_message>
Spring MVC Hello World XML based Configurations
</commit_message>
<xml_diff>
--- a/doc/Spring.pptx
+++ b/doc/Spring.pptx
@@ -5,10 +5,10 @@
     <p:sldMasterId id="2147483912" r:id="rId2"/>
   </p:sldMasterIdLst>
   <p:notesMasterIdLst>
-    <p:notesMasterId r:id="rId21"/>
+    <p:notesMasterId r:id="rId22"/>
   </p:notesMasterIdLst>
   <p:handoutMasterIdLst>
-    <p:handoutMasterId r:id="rId22"/>
+    <p:handoutMasterId r:id="rId23"/>
   </p:handoutMasterIdLst>
   <p:sldIdLst>
     <p:sldId id="256" r:id="rId3"/>
@@ -20,15 +20,16 @@
     <p:sldId id="274" r:id="rId9"/>
     <p:sldId id="275" r:id="rId10"/>
     <p:sldId id="276" r:id="rId11"/>
-    <p:sldId id="277" r:id="rId12"/>
-    <p:sldId id="278" r:id="rId13"/>
-    <p:sldId id="279" r:id="rId14"/>
-    <p:sldId id="285" r:id="rId15"/>
-    <p:sldId id="280" r:id="rId16"/>
-    <p:sldId id="281" r:id="rId17"/>
-    <p:sldId id="282" r:id="rId18"/>
-    <p:sldId id="284" r:id="rId19"/>
-    <p:sldId id="283" r:id="rId20"/>
+    <p:sldId id="286" r:id="rId12"/>
+    <p:sldId id="277" r:id="rId13"/>
+    <p:sldId id="278" r:id="rId14"/>
+    <p:sldId id="279" r:id="rId15"/>
+    <p:sldId id="285" r:id="rId16"/>
+    <p:sldId id="280" r:id="rId17"/>
+    <p:sldId id="281" r:id="rId18"/>
+    <p:sldId id="282" r:id="rId19"/>
+    <p:sldId id="284" r:id="rId20"/>
+    <p:sldId id="283" r:id="rId21"/>
   </p:sldIdLst>
   <p:sldSz cx="12188825" cy="6858000"/>
   <p:notesSz cx="6858000" cy="9144000"/>
@@ -5647,12 +5648,8 @@
           <a:lstStyle/>
           <a:p>
             <a:r>
-              <a:rPr lang="en-US" altLang="en-US" dirty="0"/>
-              <a:t>Aspect Oriented </a:t>
-            </a:r>
-            <a:r>
-              <a:rPr lang="en-US" altLang="en-US" dirty="0" smtClean="0"/>
-              <a:t>Programming</a:t>
+              <a:rPr lang="en-US" dirty="0" err="1" smtClean="0"/>
+              <a:t>BeanFactory</a:t>
             </a:r>
             <a:endParaRPr lang="en-US" dirty="0"/>
           </a:p>
@@ -5674,6 +5671,48 @@
             <a:normAutofit fontScale="92500"/>
           </a:bodyPr>
           <a:lstStyle/>
+          <a:p>
+            <a:pPr>
+              <a:lnSpc>
+                <a:spcPct val="150000"/>
+              </a:lnSpc>
+            </a:pPr>
+            <a:r>
+              <a:rPr lang="en-US" dirty="0" smtClean="0"/>
+              <a:t>Seen as </a:t>
+            </a:r>
+            <a:r>
+              <a:rPr lang="en-US" dirty="0" err="1" smtClean="0"/>
+              <a:t>ApplicationContext</a:t>
+            </a:r>
+            <a:r>
+              <a:rPr lang="en-US" dirty="0" smtClean="0"/>
+              <a:t> which is a superset of </a:t>
+            </a:r>
+            <a:r>
+              <a:rPr lang="en-US" dirty="0" err="1" smtClean="0"/>
+              <a:t>BeanFactory</a:t>
+            </a:r>
+            <a:r>
+              <a:rPr lang="en-US" dirty="0" smtClean="0"/>
+              <a:t> </a:t>
+            </a:r>
+          </a:p>
+          <a:p>
+            <a:pPr>
+              <a:lnSpc>
+                <a:spcPct val="150000"/>
+              </a:lnSpc>
+            </a:pPr>
+            <a:r>
+              <a:rPr lang="en-US" dirty="0" err="1" smtClean="0"/>
+              <a:t>SpringFactory</a:t>
+            </a:r>
+            <a:r>
+              <a:rPr lang="en-US" dirty="0" smtClean="0"/>
+              <a:t> is used to create, manage and locate beans.</a:t>
+            </a:r>
+          </a:p>
           <a:p>
             <a:pPr marL="0" indent="0">
               <a:lnSpc>
@@ -5682,50 +5721,68 @@
               <a:buNone/>
             </a:pPr>
             <a:r>
-              <a:rPr lang="en-US" dirty="0"/>
-              <a:t>Aspect Oriented Programming entails breaking down program logic into distinct parts called so-called concerns. </a:t>
-            </a:r>
-            <a:endParaRPr lang="en-US" dirty="0" smtClean="0"/>
-          </a:p>
-          <a:p>
-            <a:pPr marL="0" indent="0">
+              <a:rPr lang="en-US" b="1" dirty="0" smtClean="0"/>
+              <a:t>Bean</a:t>
+            </a:r>
+            <a:r>
+              <a:rPr lang="en-US" dirty="0" smtClean="0"/>
+              <a:t> is :</a:t>
+            </a:r>
+          </a:p>
+          <a:p>
+            <a:pPr lvl="1">
               <a:lnSpc>
                 <a:spcPct val="150000"/>
               </a:lnSpc>
-              <a:buNone/>
+              <a:buFont typeface="Courier New" panose="02070309020205020404" pitchFamily="49" charset="0"/>
+              <a:buChar char="o"/>
             </a:pPr>
             <a:r>
-              <a:rPr lang="en-US" dirty="0" smtClean="0"/>
-              <a:t>The </a:t>
-            </a:r>
-            <a:r>
-              <a:rPr lang="en-US" dirty="0"/>
-              <a:t>functions that span multiple points of an application are called cross-cutting concerns and these cross-cutting concerns are conceptually separate from the application's business logic. </a:t>
-            </a:r>
-            <a:endParaRPr lang="en-US" dirty="0" smtClean="0"/>
-          </a:p>
-          <a:p>
-            <a:pPr marL="0" indent="0">
+              <a:rPr lang="en-US" altLang="en-US" dirty="0"/>
+              <a:t>Typical java bean with a unique </a:t>
+            </a:r>
+            <a:r>
+              <a:rPr lang="en-US" altLang="en-US" dirty="0" smtClean="0"/>
+              <a:t>id</a:t>
+            </a:r>
+          </a:p>
+          <a:p>
+            <a:pPr lvl="1">
               <a:lnSpc>
                 <a:spcPct val="150000"/>
               </a:lnSpc>
-              <a:buNone/>
+              <a:buFont typeface="Courier New" panose="02070309020205020404" pitchFamily="49" charset="0"/>
+              <a:buChar char="o"/>
             </a:pPr>
             <a:r>
-              <a:rPr lang="en-US" dirty="0" smtClean="0"/>
-              <a:t>There </a:t>
-            </a:r>
-            <a:r>
-              <a:rPr lang="en-US" dirty="0"/>
-              <a:t>are various common good examples of aspects like logging, auditing, declarative transactions, security, and caching etc.</a:t>
-            </a:r>
+              <a:rPr lang="en-US" altLang="en-US" dirty="0" smtClean="0"/>
+              <a:t>Beans are from two types : (singleton and prototype)</a:t>
+            </a:r>
+          </a:p>
+          <a:p>
+            <a:pPr lvl="1">
+              <a:lnSpc>
+                <a:spcPct val="150000"/>
+              </a:lnSpc>
+              <a:buFont typeface="Courier New" panose="02070309020205020404" pitchFamily="49" charset="0"/>
+              <a:buChar char="o"/>
+            </a:pPr>
+            <a:r>
+              <a:rPr lang="en-US" altLang="en-US" dirty="0"/>
+              <a:t>Beans are normally created by Spring as late as </a:t>
+            </a:r>
+            <a:r>
+              <a:rPr lang="en-US" altLang="en-US" dirty="0" smtClean="0"/>
+              <a:t>possible</a:t>
+            </a:r>
+            <a:endParaRPr lang="en-US" altLang="en-US" dirty="0"/>
           </a:p>
         </p:txBody>
       </p:sp>
     </p:spTree>
     <p:extLst>
       <p:ext uri="{BB962C8B-B14F-4D97-AF65-F5344CB8AC3E}">
-        <p14:creationId xmlns:p14="http://schemas.microsoft.com/office/powerpoint/2010/main" val="2611089958"/>
+        <p14:creationId xmlns:p14="http://schemas.microsoft.com/office/powerpoint/2010/main" val="1138619014"/>
       </p:ext>
     </p:extLst>
   </p:cSld>
@@ -5744,13 +5801,6 @@
       </p:transition>
     </mc:Fallback>
   </mc:AlternateContent>
-  <p:timing>
-    <p:tnLst>
-      <p:par>
-        <p:cTn id="1" dur="indefinite" restart="never" nodeType="tmRoot"/>
-      </p:par>
-    </p:tnLst>
-  </p:timing>
 </p:sld>
 </file>
 
@@ -5788,7 +5838,11 @@
           <a:p>
             <a:r>
               <a:rPr lang="en-US" altLang="en-US" dirty="0"/>
-              <a:t>Portable Service Abstractions</a:t>
+              <a:t>Aspect Oriented </a:t>
+            </a:r>
+            <a:r>
+              <a:rPr lang="en-US" altLang="en-US" dirty="0" smtClean="0"/>
+              <a:t>Programming</a:t>
             </a:r>
             <a:endParaRPr lang="en-US" dirty="0"/>
           </a:p>
@@ -5806,62 +5860,75 @@
         </p:nvSpPr>
         <p:spPr/>
         <p:txBody>
-          <a:bodyPr/>
+          <a:bodyPr>
+            <a:normAutofit fontScale="92500"/>
+          </a:bodyPr>
           <a:lstStyle/>
           <a:p>
-            <a:pPr marL="320040" lvl="1" indent="0">
+            <a:pPr marL="0" indent="0">
               <a:lnSpc>
                 <a:spcPct val="150000"/>
               </a:lnSpc>
               <a:buNone/>
             </a:pPr>
             <a:r>
-              <a:rPr lang="en-US" altLang="en-US" dirty="0"/>
-              <a:t>The rest of spring</a:t>
-            </a:r>
-          </a:p>
-          <a:p>
-            <a:pPr lvl="2">
+              <a:rPr lang="en-US" dirty="0"/>
+              <a:t>Aspect Oriented Programming entails breaking down program logic into distinct parts called so-called concerns. </a:t>
+            </a:r>
+            <a:endParaRPr lang="en-US" dirty="0" smtClean="0"/>
+          </a:p>
+          <a:p>
+            <a:pPr marL="0" indent="0">
               <a:lnSpc>
                 <a:spcPct val="150000"/>
               </a:lnSpc>
+              <a:buNone/>
             </a:pPr>
             <a:r>
-              <a:rPr lang="en-US" altLang="en-US" dirty="0"/>
-              <a:t>ORM, DAO, Web MVC, Web, etc.</a:t>
-            </a:r>
-          </a:p>
-          <a:p>
-            <a:pPr lvl="2">
+              <a:rPr lang="en-US" dirty="0" smtClean="0"/>
+              <a:t>The </a:t>
+            </a:r>
+            <a:r>
+              <a:rPr lang="en-US" dirty="0"/>
+              <a:t>functions that span multiple points of an application are called cross-cutting concerns and these cross-cutting concerns are conceptually separate from the application's business logic. </a:t>
+            </a:r>
+            <a:endParaRPr lang="en-US" dirty="0" smtClean="0"/>
+          </a:p>
+          <a:p>
+            <a:pPr marL="0" indent="0">
               <a:lnSpc>
                 <a:spcPct val="150000"/>
               </a:lnSpc>
+              <a:buNone/>
             </a:pPr>
             <a:r>
-              <a:rPr lang="en-US" altLang="en-US" dirty="0"/>
-              <a:t>Allows access to these without knowing how they actually work</a:t>
-            </a:r>
-            <a:endParaRPr lang="en-US" dirty="0"/>
+              <a:rPr lang="en-US" dirty="0" smtClean="0"/>
+              <a:t>There </a:t>
+            </a:r>
+            <a:r>
+              <a:rPr lang="en-US" dirty="0"/>
+              <a:t>are various common good examples of aspects like logging, auditing, declarative transactions, security, and caching etc.</a:t>
+            </a:r>
           </a:p>
         </p:txBody>
       </p:sp>
     </p:spTree>
     <p:extLst>
       <p:ext uri="{BB962C8B-B14F-4D97-AF65-F5344CB8AC3E}">
-        <p14:creationId xmlns:p14="http://schemas.microsoft.com/office/powerpoint/2010/main" val="3756781812"/>
+        <p14:creationId xmlns:p14="http://schemas.microsoft.com/office/powerpoint/2010/main" val="2611089958"/>
       </p:ext>
     </p:extLst>
   </p:cSld>
   <p:clrMapOvr>
     <a:masterClrMapping/>
   </p:clrMapOvr>
-  <mc:AlternateContent xmlns:mc="http://schemas.openxmlformats.org/markup-compatibility/2006">
-    <mc:Choice xmlns:p14="http://schemas.microsoft.com/office/powerpoint/2010/main" Requires="p14">
+  <mc:AlternateContent xmlns:mc="http://schemas.openxmlformats.org/markup-compatibility/2006" xmlns:p14="http://schemas.microsoft.com/office/powerpoint/2010/main">
+    <mc:Choice Requires="p14">
       <p:transition spd="med" p14:dur="700">
         <p:fade/>
       </p:transition>
     </mc:Choice>
-    <mc:Fallback>
+    <mc:Fallback xmlns="">
       <p:transition spd="med">
         <p:fade/>
       </p:transition>
@@ -5910,8 +5977,8 @@
           <a:lstStyle/>
           <a:p>
             <a:r>
-              <a:rPr lang="en-US" dirty="0" smtClean="0"/>
-              <a:t>Spring MVC</a:t>
+              <a:rPr lang="en-US" altLang="en-US" dirty="0"/>
+              <a:t>Portable Service Abstractions</a:t>
             </a:r>
             <a:endParaRPr lang="en-US" dirty="0"/>
           </a:p>
@@ -5929,68 +5996,40 @@
         </p:nvSpPr>
         <p:spPr/>
         <p:txBody>
-          <a:bodyPr>
-            <a:normAutofit fontScale="85000" lnSpcReduction="10000"/>
-          </a:bodyPr>
+          <a:bodyPr/>
           <a:lstStyle/>
           <a:p>
-            <a:pPr marL="0" indent="0">
+            <a:pPr marL="320040" lvl="1" indent="0">
               <a:lnSpc>
                 <a:spcPct val="150000"/>
               </a:lnSpc>
               <a:buNone/>
             </a:pPr>
             <a:r>
-              <a:rPr lang="en-US" dirty="0"/>
-              <a:t>Spring MVC </a:t>
-            </a:r>
-            <a:r>
-              <a:rPr lang="en-US" dirty="0" smtClean="0"/>
-              <a:t>is </a:t>
-            </a:r>
-            <a:r>
-              <a:rPr lang="en-US" dirty="0"/>
-              <a:t>designed around a </a:t>
-            </a:r>
-            <a:r>
-              <a:rPr lang="en-US" dirty="0" smtClean="0"/>
-              <a:t>Dispatcher Servlet </a:t>
-            </a:r>
-            <a:r>
-              <a:rPr lang="en-US" dirty="0"/>
-              <a:t>that dispatches requests to handlers, with configurable handler mappings, view resolution, locale, time zone and theme resolution as well as support for uploading files</a:t>
-            </a:r>
-            <a:r>
-              <a:rPr lang="en-US" dirty="0" smtClean="0"/>
-              <a:t>.</a:t>
-            </a:r>
-          </a:p>
-          <a:p>
-            <a:pPr marL="0" indent="0">
+              <a:rPr lang="en-US" altLang="en-US" dirty="0"/>
+              <a:t>The rest of spring</a:t>
+            </a:r>
+          </a:p>
+          <a:p>
+            <a:pPr lvl="2">
               <a:lnSpc>
                 <a:spcPct val="150000"/>
               </a:lnSpc>
-              <a:buNone/>
             </a:pPr>
             <a:r>
-              <a:rPr lang="en-US" dirty="0" smtClean="0"/>
-              <a:t>The </a:t>
-            </a:r>
-            <a:r>
-              <a:rPr lang="en-US" dirty="0"/>
-              <a:t>default handler is based on the @Controller and @</a:t>
-            </a:r>
-            <a:r>
-              <a:rPr lang="en-US" dirty="0" err="1"/>
-              <a:t>RequestMapping</a:t>
-            </a:r>
-            <a:r>
-              <a:rPr lang="en-US" dirty="0"/>
-              <a:t> annotations, offering a wide range of flexible handling methods. With the introduction of Spring 3.0, the @Controller mechanism also allows you to create RESTful Web sites and </a:t>
-            </a:r>
-            <a:r>
-              <a:rPr lang="en-US" dirty="0" smtClean="0"/>
-              <a:t>applications.</a:t>
+              <a:rPr lang="en-US" altLang="en-US" dirty="0"/>
+              <a:t>ORM, DAO, Web MVC, Web, etc.</a:t>
+            </a:r>
+          </a:p>
+          <a:p>
+            <a:pPr lvl="2">
+              <a:lnSpc>
+                <a:spcPct val="150000"/>
+              </a:lnSpc>
+            </a:pPr>
+            <a:r>
+              <a:rPr lang="en-US" altLang="en-US" dirty="0"/>
+              <a:t>Allows access to these without knowing how they actually work</a:t>
             </a:r>
             <a:endParaRPr lang="en-US" dirty="0"/>
           </a:p>
@@ -5999,20 +6038,20 @@
     </p:spTree>
     <p:extLst>
       <p:ext uri="{BB962C8B-B14F-4D97-AF65-F5344CB8AC3E}">
-        <p14:creationId xmlns:p14="http://schemas.microsoft.com/office/powerpoint/2010/main" val="535253249"/>
+        <p14:creationId xmlns:p14="http://schemas.microsoft.com/office/powerpoint/2010/main" val="3756781812"/>
       </p:ext>
     </p:extLst>
   </p:cSld>
   <p:clrMapOvr>
     <a:masterClrMapping/>
   </p:clrMapOvr>
-  <mc:AlternateContent xmlns:mc="http://schemas.openxmlformats.org/markup-compatibility/2006">
-    <mc:Choice xmlns:p14="http://schemas.microsoft.com/office/powerpoint/2010/main" Requires="p14">
+  <mc:AlternateContent xmlns:mc="http://schemas.openxmlformats.org/markup-compatibility/2006" xmlns:p14="http://schemas.microsoft.com/office/powerpoint/2010/main">
+    <mc:Choice Requires="p14">
       <p:transition spd="med" p14:dur="700">
         <p:fade/>
       </p:transition>
     </mc:Choice>
-    <mc:Fallback>
+    <mc:Fallback xmlns="">
       <p:transition spd="med">
         <p:fade/>
       </p:transition>
@@ -6029,6 +6068,157 @@
 </file>
 
 <file path=ppt/slides/slide13.xml><?xml version="1.0" encoding="utf-8"?>
+<p:sld xmlns:a="http://schemas.openxmlformats.org/drawingml/2006/main" xmlns:r="http://schemas.openxmlformats.org/officeDocument/2006/relationships" xmlns:p="http://schemas.openxmlformats.org/presentationml/2006/main">
+  <p:cSld>
+    <p:spTree>
+      <p:nvGrpSpPr>
+        <p:cNvPr id="1" name=""/>
+        <p:cNvGrpSpPr/>
+        <p:nvPr/>
+      </p:nvGrpSpPr>
+      <p:grpSpPr>
+        <a:xfrm>
+          <a:off x="0" y="0"/>
+          <a:ext cx="0" cy="0"/>
+          <a:chOff x="0" y="0"/>
+          <a:chExt cx="0" cy="0"/>
+        </a:xfrm>
+      </p:grpSpPr>
+      <p:sp>
+        <p:nvSpPr>
+          <p:cNvPr id="2" name="Title 1"/>
+          <p:cNvSpPr>
+            <a:spLocks noGrp="1"/>
+          </p:cNvSpPr>
+          <p:nvPr>
+            <p:ph type="title"/>
+          </p:nvPr>
+        </p:nvSpPr>
+        <p:spPr/>
+        <p:txBody>
+          <a:bodyPr/>
+          <a:lstStyle/>
+          <a:p>
+            <a:r>
+              <a:rPr lang="en-US" dirty="0" smtClean="0"/>
+              <a:t>Spring MVC</a:t>
+            </a:r>
+            <a:endParaRPr lang="en-US" dirty="0"/>
+          </a:p>
+        </p:txBody>
+      </p:sp>
+      <p:sp>
+        <p:nvSpPr>
+          <p:cNvPr id="3" name="Content Placeholder 2"/>
+          <p:cNvSpPr>
+            <a:spLocks noGrp="1"/>
+          </p:cNvSpPr>
+          <p:nvPr>
+            <p:ph idx="1"/>
+          </p:nvPr>
+        </p:nvSpPr>
+        <p:spPr/>
+        <p:txBody>
+          <a:bodyPr>
+            <a:normAutofit fontScale="85000" lnSpcReduction="10000"/>
+          </a:bodyPr>
+          <a:lstStyle/>
+          <a:p>
+            <a:pPr marL="0" indent="0">
+              <a:lnSpc>
+                <a:spcPct val="150000"/>
+              </a:lnSpc>
+              <a:buNone/>
+            </a:pPr>
+            <a:r>
+              <a:rPr lang="en-US" dirty="0"/>
+              <a:t>Spring MVC </a:t>
+            </a:r>
+            <a:r>
+              <a:rPr lang="en-US" dirty="0" smtClean="0"/>
+              <a:t>is </a:t>
+            </a:r>
+            <a:r>
+              <a:rPr lang="en-US" dirty="0"/>
+              <a:t>designed around a </a:t>
+            </a:r>
+            <a:r>
+              <a:rPr lang="en-US" dirty="0" smtClean="0"/>
+              <a:t>Dispatcher Servlet </a:t>
+            </a:r>
+            <a:r>
+              <a:rPr lang="en-US" dirty="0"/>
+              <a:t>that dispatches requests to handlers, with configurable handler mappings, view resolution, locale, time zone and theme resolution as well as support for uploading files</a:t>
+            </a:r>
+            <a:r>
+              <a:rPr lang="en-US" dirty="0" smtClean="0"/>
+              <a:t>.</a:t>
+            </a:r>
+          </a:p>
+          <a:p>
+            <a:pPr marL="0" indent="0">
+              <a:lnSpc>
+                <a:spcPct val="150000"/>
+              </a:lnSpc>
+              <a:buNone/>
+            </a:pPr>
+            <a:r>
+              <a:rPr lang="en-US" dirty="0" smtClean="0"/>
+              <a:t>The </a:t>
+            </a:r>
+            <a:r>
+              <a:rPr lang="en-US" dirty="0"/>
+              <a:t>default handler is based on the @Controller and @</a:t>
+            </a:r>
+            <a:r>
+              <a:rPr lang="en-US" dirty="0" err="1"/>
+              <a:t>RequestMapping</a:t>
+            </a:r>
+            <a:r>
+              <a:rPr lang="en-US" dirty="0"/>
+              <a:t> annotations, offering a wide range of flexible handling methods. With the introduction of Spring 3.0, the @Controller mechanism also allows you to create RESTful Web sites and </a:t>
+            </a:r>
+            <a:r>
+              <a:rPr lang="en-US" dirty="0" smtClean="0"/>
+              <a:t>applications.</a:t>
+            </a:r>
+            <a:endParaRPr lang="en-US" dirty="0"/>
+          </a:p>
+        </p:txBody>
+      </p:sp>
+    </p:spTree>
+    <p:extLst>
+      <p:ext uri="{BB962C8B-B14F-4D97-AF65-F5344CB8AC3E}">
+        <p14:creationId xmlns:p14="http://schemas.microsoft.com/office/powerpoint/2010/main" val="535253249"/>
+      </p:ext>
+    </p:extLst>
+  </p:cSld>
+  <p:clrMapOvr>
+    <a:masterClrMapping/>
+  </p:clrMapOvr>
+  <mc:AlternateContent xmlns:mc="http://schemas.openxmlformats.org/markup-compatibility/2006" xmlns:p14="http://schemas.microsoft.com/office/powerpoint/2010/main">
+    <mc:Choice Requires="p14">
+      <p:transition spd="med" p14:dur="700">
+        <p:fade/>
+      </p:transition>
+    </mc:Choice>
+    <mc:Fallback xmlns="">
+      <p:transition spd="med">
+        <p:fade/>
+      </p:transition>
+    </mc:Fallback>
+  </mc:AlternateContent>
+  <p:timing>
+    <p:tnLst>
+      <p:par>
+        <p:cTn id="1" dur="indefinite" restart="never" nodeType="tmRoot"/>
+      </p:par>
+    </p:tnLst>
+  </p:timing>
+</p:sld>
+</file>
+
+<file path=ppt/slides/slide14.xml><?xml version="1.0" encoding="utf-8"?>
 <p:sld xmlns:a="http://schemas.openxmlformats.org/drawingml/2006/main" xmlns:r="http://schemas.openxmlformats.org/officeDocument/2006/relationships" xmlns:p="http://schemas.openxmlformats.org/presentationml/2006/main">
   <p:cSld>
     <p:spTree>
@@ -7383,13 +7573,13 @@
   <p:clrMapOvr>
     <a:masterClrMapping/>
   </p:clrMapOvr>
-  <mc:AlternateContent xmlns:mc="http://schemas.openxmlformats.org/markup-compatibility/2006">
-    <mc:Choice xmlns:p14="http://schemas.microsoft.com/office/powerpoint/2010/main" Requires="p14">
+  <mc:AlternateContent xmlns:mc="http://schemas.openxmlformats.org/markup-compatibility/2006" xmlns:p14="http://schemas.microsoft.com/office/powerpoint/2010/main">
+    <mc:Choice Requires="p14">
       <p:transition spd="med" p14:dur="700">
         <p:fade/>
       </p:transition>
     </mc:Choice>
-    <mc:Fallback>
+    <mc:Fallback xmlns="">
       <p:transition spd="med">
         <p:fade/>
       </p:transition>
@@ -7398,7 +7588,7 @@
 </p:sld>
 </file>
 
-<file path=ppt/slides/slide14.xml><?xml version="1.0" encoding="utf-8"?>
+<file path=ppt/slides/slide15.xml><?xml version="1.0" encoding="utf-8"?>
 <p:sld xmlns:a="http://schemas.openxmlformats.org/drawingml/2006/main" xmlns:r="http://schemas.openxmlformats.org/officeDocument/2006/relationships" xmlns:p="http://schemas.openxmlformats.org/presentationml/2006/main">
   <p:cSld>
     <p:spTree>
@@ -8000,124 +8190,13 @@
   <p:clrMapOvr>
     <a:masterClrMapping/>
   </p:clrMapOvr>
-  <mc:AlternateContent xmlns:mc="http://schemas.openxmlformats.org/markup-compatibility/2006">
-    <mc:Choice xmlns:p14="http://schemas.microsoft.com/office/powerpoint/2010/main" Requires="p14">
+  <mc:AlternateContent xmlns:mc="http://schemas.openxmlformats.org/markup-compatibility/2006" xmlns:p14="http://schemas.microsoft.com/office/powerpoint/2010/main">
+    <mc:Choice Requires="p14">
       <p:transition spd="med" p14:dur="700">
         <p:fade/>
       </p:transition>
     </mc:Choice>
-    <mc:Fallback>
-      <p:transition spd="med">
-        <p:fade/>
-      </p:transition>
-    </mc:Fallback>
-  </mc:AlternateContent>
-  <p:timing>
-    <p:tnLst>
-      <p:par>
-        <p:cTn id="1" dur="indefinite" restart="never" nodeType="tmRoot"/>
-      </p:par>
-    </p:tnLst>
-  </p:timing>
-</p:sld>
-</file>
-
-<file path=ppt/slides/slide15.xml><?xml version="1.0" encoding="utf-8"?>
-<p:sld xmlns:a="http://schemas.openxmlformats.org/drawingml/2006/main" xmlns:r="http://schemas.openxmlformats.org/officeDocument/2006/relationships" xmlns:p="http://schemas.openxmlformats.org/presentationml/2006/main">
-  <p:cSld>
-    <p:spTree>
-      <p:nvGrpSpPr>
-        <p:cNvPr id="1" name=""/>
-        <p:cNvGrpSpPr/>
-        <p:nvPr/>
-      </p:nvGrpSpPr>
-      <p:grpSpPr>
-        <a:xfrm>
-          <a:off x="0" y="0"/>
-          <a:ext cx="0" cy="0"/>
-          <a:chOff x="0" y="0"/>
-          <a:chExt cx="0" cy="0"/>
-        </a:xfrm>
-      </p:grpSpPr>
-      <p:sp>
-        <p:nvSpPr>
-          <p:cNvPr id="2" name="Title 1"/>
-          <p:cNvSpPr>
-            <a:spLocks noGrp="1"/>
-          </p:cNvSpPr>
-          <p:nvPr>
-            <p:ph type="title"/>
-          </p:nvPr>
-        </p:nvSpPr>
-        <p:spPr/>
-        <p:txBody>
-          <a:bodyPr/>
-          <a:lstStyle/>
-          <a:p>
-            <a:r>
-              <a:rPr lang="en-US" dirty="0" smtClean="0"/>
-              <a:t>Spring ORM</a:t>
-            </a:r>
-            <a:endParaRPr lang="en-US" dirty="0"/>
-          </a:p>
-        </p:txBody>
-      </p:sp>
-      <p:sp>
-        <p:nvSpPr>
-          <p:cNvPr id="3" name="Content Placeholder 2"/>
-          <p:cNvSpPr>
-            <a:spLocks noGrp="1"/>
-          </p:cNvSpPr>
-          <p:nvPr>
-            <p:ph idx="1"/>
-          </p:nvPr>
-        </p:nvSpPr>
-        <p:spPr/>
-        <p:txBody>
-          <a:bodyPr>
-            <a:normAutofit fontScale="92500"/>
-          </a:bodyPr>
-          <a:lstStyle/>
-          <a:p>
-            <a:pPr marL="0" indent="0">
-              <a:lnSpc>
-                <a:spcPct val="150000"/>
-              </a:lnSpc>
-              <a:buNone/>
-            </a:pPr>
-            <a:r>
-              <a:rPr lang="en-US" dirty="0"/>
-              <a:t>Spring adds significant enhancements to the ORM layer of your choice when you create data access applications. You can leverage as much of the integration support as you wish, and you should compare this integration effort with the cost and risk of building a similar infrastructure in-house. You can use much of the ORM support as you would a library, regardless of technology, because everything is designed as a set of reusable JavaBeans. ORM in a Spring </a:t>
-            </a:r>
-            <a:r>
-              <a:rPr lang="en-US" dirty="0" err="1"/>
-              <a:t>IoC</a:t>
-            </a:r>
-            <a:r>
-              <a:rPr lang="en-US" dirty="0"/>
-              <a:t> container facilitates configuration and deployment</a:t>
-            </a:r>
-            <a:endParaRPr lang="en-US" dirty="0"/>
-          </a:p>
-        </p:txBody>
-      </p:sp>
-    </p:spTree>
-    <p:extLst>
-      <p:ext uri="{BB962C8B-B14F-4D97-AF65-F5344CB8AC3E}">
-        <p14:creationId xmlns:p14="http://schemas.microsoft.com/office/powerpoint/2010/main" val="3246588659"/>
-      </p:ext>
-    </p:extLst>
-  </p:cSld>
-  <p:clrMapOvr>
-    <a:masterClrMapping/>
-  </p:clrMapOvr>
-  <mc:AlternateContent xmlns:mc="http://schemas.openxmlformats.org/markup-compatibility/2006">
-    <mc:Choice xmlns:p14="http://schemas.microsoft.com/office/powerpoint/2010/main" Requires="p14">
-      <p:transition spd="med" p14:dur="700">
-        <p:fade/>
-      </p:transition>
-    </mc:Choice>
-    <mc:Fallback>
+    <mc:Fallback xmlns="">
       <p:transition spd="med">
         <p:fade/>
       </p:transition>
@@ -8167,7 +8246,7 @@
           <a:p>
             <a:r>
               <a:rPr lang="en-US" dirty="0" smtClean="0"/>
-              <a:t>Spring Security</a:t>
+              <a:t>Spring ORM</a:t>
             </a:r>
             <a:endParaRPr lang="en-US" dirty="0"/>
           </a:p>
@@ -8186,92 +8265,48 @@
         <p:spPr/>
         <p:txBody>
           <a:bodyPr>
-            <a:normAutofit fontScale="62500" lnSpcReduction="20000"/>
+            <a:normAutofit fontScale="92500"/>
           </a:bodyPr>
           <a:lstStyle/>
           <a:p>
-            <a:pPr>
-              <a:lnSpc>
-                <a:spcPct val="160000"/>
-              </a:lnSpc>
-            </a:pPr>
-            <a:r>
-              <a:rPr lang="en-US" dirty="0" smtClean="0"/>
-              <a:t>History</a:t>
-            </a:r>
-          </a:p>
-          <a:p>
             <a:pPr marL="0" indent="0">
               <a:lnSpc>
-                <a:spcPct val="160000"/>
+                <a:spcPct val="150000"/>
               </a:lnSpc>
               <a:buNone/>
             </a:pPr>
             <a:r>
               <a:rPr lang="en-US" dirty="0"/>
-              <a:t>Spring Security began in late 2003 as “The </a:t>
+              <a:t>Spring adds significant enhancements to the ORM layer of your choice when you create data access applications. You can leverage as much of the integration support as you wish, and you should compare this integration effort with the cost and risk of building a similar infrastructure in-house. You can use much of the ORM support as you would a library, regardless of technology, because everything is designed as a set of reusable JavaBeans. ORM in a Spring </a:t>
             </a:r>
             <a:r>
               <a:rPr lang="en-US" dirty="0" err="1"/>
-              <a:t>Acegi</a:t>
+              <a:t>IoC</a:t>
             </a:r>
             <a:r>
               <a:rPr lang="en-US" dirty="0"/>
-              <a:t> Security System for Spring”. A question was posed on the Spring Developers' mailing list asking whether there had been any consideration given to a Spring-based security implementation. At the time the Spring community was relatively </a:t>
-            </a:r>
-            <a:r>
-              <a:rPr lang="en-US" dirty="0" smtClean="0"/>
-              <a:t>small, and </a:t>
-            </a:r>
-            <a:r>
-              <a:rPr lang="en-US" dirty="0"/>
-              <a:t>indeed Spring itself had only existed as a </a:t>
-            </a:r>
-            <a:r>
-              <a:rPr lang="en-US" dirty="0" err="1"/>
-              <a:t>SourceForge</a:t>
-            </a:r>
-            <a:r>
-              <a:rPr lang="en-US" dirty="0"/>
-              <a:t> project from early 2003. The response to the question was that it was a worthwhile area, although a lack of time currently prevented its exploration</a:t>
-            </a:r>
-            <a:r>
-              <a:rPr lang="en-US" dirty="0" smtClean="0"/>
-              <a:t>.</a:t>
-            </a:r>
-          </a:p>
-          <a:p>
-            <a:pPr marL="0" indent="0">
-              <a:lnSpc>
-                <a:spcPct val="160000"/>
-              </a:lnSpc>
-              <a:buNone/>
-            </a:pPr>
-            <a:r>
-              <a:rPr lang="en-US" dirty="0"/>
-              <a:t>With that in mind, a simple security implementation was built and not released. A few weeks later another member of the Spring community inquired about security, and at the time this code was offered to them.</a:t>
-            </a:r>
-            <a:endParaRPr lang="en-US" dirty="0"/>
+              <a:t> container facilitates configuration and deployment</a:t>
+            </a:r>
           </a:p>
         </p:txBody>
       </p:sp>
     </p:spTree>
     <p:extLst>
       <p:ext uri="{BB962C8B-B14F-4D97-AF65-F5344CB8AC3E}">
-        <p14:creationId xmlns:p14="http://schemas.microsoft.com/office/powerpoint/2010/main" val="469215125"/>
+        <p14:creationId xmlns:p14="http://schemas.microsoft.com/office/powerpoint/2010/main" val="3246588659"/>
       </p:ext>
     </p:extLst>
   </p:cSld>
   <p:clrMapOvr>
     <a:masterClrMapping/>
   </p:clrMapOvr>
-  <mc:AlternateContent xmlns:mc="http://schemas.openxmlformats.org/markup-compatibility/2006">
-    <mc:Choice xmlns:p14="http://schemas.microsoft.com/office/powerpoint/2010/main" Requires="p14">
+  <mc:AlternateContent xmlns:mc="http://schemas.openxmlformats.org/markup-compatibility/2006" xmlns:p14="http://schemas.microsoft.com/office/powerpoint/2010/main">
+    <mc:Choice Requires="p14">
       <p:transition spd="med" p14:dur="700">
         <p:fade/>
       </p:transition>
     </mc:Choice>
-    <mc:Fallback>
+    <mc:Fallback xmlns="">
       <p:transition spd="med">
         <p:fade/>
       </p:transition>
@@ -8320,12 +8355,8 @@
           <a:lstStyle/>
           <a:p>
             <a:r>
-              <a:rPr lang="en-US" dirty="0"/>
-              <a:t>Spring </a:t>
-            </a:r>
-            <a:r>
               <a:rPr lang="en-US" dirty="0" smtClean="0"/>
-              <a:t>Security cont.</a:t>
+              <a:t>Spring Security</a:t>
             </a:r>
             <a:endParaRPr lang="en-US" dirty="0"/>
           </a:p>
@@ -8343,109 +8374,104 @@
         </p:nvSpPr>
         <p:spPr/>
         <p:txBody>
-          <a:bodyPr/>
+          <a:bodyPr>
+            <a:normAutofit fontScale="62500" lnSpcReduction="20000"/>
+          </a:bodyPr>
           <a:lstStyle/>
+          <a:p>
+            <a:pPr>
+              <a:lnSpc>
+                <a:spcPct val="160000"/>
+              </a:lnSpc>
+            </a:pPr>
+            <a:r>
+              <a:rPr lang="en-US" dirty="0" smtClean="0"/>
+              <a:t>History</a:t>
+            </a:r>
+          </a:p>
           <a:p>
             <a:pPr marL="0" indent="0">
               <a:lnSpc>
-                <a:spcPct val="150000"/>
+                <a:spcPct val="160000"/>
               </a:lnSpc>
               <a:buNone/>
             </a:pPr>
             <a:r>
               <a:rPr lang="en-US" dirty="0"/>
-              <a:t>Spring Security is a framework that </a:t>
+              <a:t>Spring Security began in late 2003 as “The </a:t>
+            </a:r>
+            <a:r>
+              <a:rPr lang="en-US" dirty="0" err="1"/>
+              <a:t>Acegi</a:t>
+            </a:r>
+            <a:r>
+              <a:rPr lang="en-US" dirty="0"/>
+              <a:t> Security System for Spring”. A question was posed on the Spring Developers' mailing list asking whether there had been any consideration given to a Spring-based security implementation. At the time the Spring community was relatively </a:t>
             </a:r>
             <a:r>
               <a:rPr lang="en-US" dirty="0" smtClean="0"/>
-              <a:t>provides:</a:t>
-            </a:r>
-          </a:p>
-          <a:p>
-            <a:pPr lvl="1">
+              <a:t>small, and </a:t>
+            </a:r>
+            <a:r>
+              <a:rPr lang="en-US" dirty="0"/>
+              <a:t>indeed Spring itself had only existed as a </a:t>
+            </a:r>
+            <a:r>
+              <a:rPr lang="en-US" dirty="0" err="1"/>
+              <a:t>SourceForge</a:t>
+            </a:r>
+            <a:r>
+              <a:rPr lang="en-US" dirty="0"/>
+              <a:t> project from early 2003. The response to the question was that it was a worthwhile area, although a lack of time currently prevented its exploration</a:t>
+            </a:r>
+            <a:r>
+              <a:rPr lang="en-US" dirty="0" smtClean="0"/>
+              <a:t>.</a:t>
+            </a:r>
+          </a:p>
+          <a:p>
+            <a:pPr marL="0" indent="0">
               <a:lnSpc>
-                <a:spcPct val="150000"/>
+                <a:spcPct val="160000"/>
               </a:lnSpc>
-              <a:buFont typeface="Arial" panose="020B0604020202020204" pitchFamily="34" charset="0"/>
-              <a:buChar char="•"/>
+              <a:buNone/>
             </a:pPr>
             <a:r>
               <a:rPr lang="en-US" dirty="0"/>
-              <a:t>Comprehensive and extensible support for both Authentication and Authorization</a:t>
-            </a:r>
-          </a:p>
-          <a:p>
-            <a:pPr lvl="1">
-              <a:lnSpc>
-                <a:spcPct val="150000"/>
-              </a:lnSpc>
-              <a:buFont typeface="Arial" panose="020B0604020202020204" pitchFamily="34" charset="0"/>
-              <a:buChar char="•"/>
-            </a:pPr>
-            <a:r>
-              <a:rPr lang="en-US" dirty="0"/>
-              <a:t>Protection against attacks like session fixation, clickjacking, cross site request forgery, </a:t>
-            </a:r>
-            <a:r>
-              <a:rPr lang="en-US" dirty="0" err="1"/>
-              <a:t>etc</a:t>
-            </a:r>
-            <a:endParaRPr lang="en-US" dirty="0"/>
-          </a:p>
-          <a:p>
-            <a:pPr lvl="1">
-              <a:lnSpc>
-                <a:spcPct val="150000"/>
-              </a:lnSpc>
-              <a:buFont typeface="Arial" panose="020B0604020202020204" pitchFamily="34" charset="0"/>
-              <a:buChar char="•"/>
-            </a:pPr>
-            <a:r>
-              <a:rPr lang="en-US" dirty="0"/>
-              <a:t>Servlet API integration</a:t>
-            </a:r>
-          </a:p>
-          <a:p>
-            <a:pPr lvl="1">
-              <a:lnSpc>
-                <a:spcPct val="150000"/>
-              </a:lnSpc>
-              <a:buFont typeface="Arial" panose="020B0604020202020204" pitchFamily="34" charset="0"/>
-              <a:buChar char="•"/>
-            </a:pPr>
-            <a:r>
-              <a:rPr lang="en-US" dirty="0"/>
-              <a:t>Optional integration with Spring Web MVC</a:t>
-            </a:r>
-          </a:p>
-          <a:p>
-            <a:pPr lvl="1"/>
-            <a:endParaRPr lang="en-US" dirty="0"/>
+              <a:t>With that in mind, a simple security implementation was built and not released. A few weeks later another member of the Spring community inquired about security, and at the time this code was offered to them.</a:t>
+            </a:r>
           </a:p>
         </p:txBody>
       </p:sp>
     </p:spTree>
     <p:extLst>
       <p:ext uri="{BB962C8B-B14F-4D97-AF65-F5344CB8AC3E}">
-        <p14:creationId xmlns:p14="http://schemas.microsoft.com/office/powerpoint/2010/main" val="444809840"/>
+        <p14:creationId xmlns:p14="http://schemas.microsoft.com/office/powerpoint/2010/main" val="469215125"/>
       </p:ext>
     </p:extLst>
   </p:cSld>
   <p:clrMapOvr>
     <a:masterClrMapping/>
   </p:clrMapOvr>
-  <mc:AlternateContent xmlns:mc="http://schemas.openxmlformats.org/markup-compatibility/2006">
-    <mc:Choice xmlns:p14="http://schemas.microsoft.com/office/powerpoint/2010/main" Requires="p14">
+  <mc:AlternateContent xmlns:mc="http://schemas.openxmlformats.org/markup-compatibility/2006" xmlns:p14="http://schemas.microsoft.com/office/powerpoint/2010/main">
+    <mc:Choice Requires="p14">
       <p:transition spd="med" p14:dur="700">
         <p:fade/>
       </p:transition>
     </mc:Choice>
-    <mc:Fallback>
+    <mc:Fallback xmlns="">
       <p:transition spd="med">
         <p:fade/>
       </p:transition>
     </mc:Fallback>
   </mc:AlternateContent>
+  <p:timing>
+    <p:tnLst>
+      <p:par>
+        <p:cTn id="1" dur="indefinite" restart="never" nodeType="tmRoot"/>
+      </p:par>
+    </p:tnLst>
+  </p:timing>
 </p:sld>
 </file>
 
@@ -8482,6 +8508,168 @@
           <a:lstStyle/>
           <a:p>
             <a:r>
+              <a:rPr lang="en-US" dirty="0"/>
+              <a:t>Spring </a:t>
+            </a:r>
+            <a:r>
+              <a:rPr lang="en-US" dirty="0" smtClean="0"/>
+              <a:t>Security cont.</a:t>
+            </a:r>
+            <a:endParaRPr lang="en-US" dirty="0"/>
+          </a:p>
+        </p:txBody>
+      </p:sp>
+      <p:sp>
+        <p:nvSpPr>
+          <p:cNvPr id="3" name="Content Placeholder 2"/>
+          <p:cNvSpPr>
+            <a:spLocks noGrp="1"/>
+          </p:cNvSpPr>
+          <p:nvPr>
+            <p:ph idx="1"/>
+          </p:nvPr>
+        </p:nvSpPr>
+        <p:spPr/>
+        <p:txBody>
+          <a:bodyPr/>
+          <a:lstStyle/>
+          <a:p>
+            <a:pPr marL="0" indent="0">
+              <a:lnSpc>
+                <a:spcPct val="150000"/>
+              </a:lnSpc>
+              <a:buNone/>
+            </a:pPr>
+            <a:r>
+              <a:rPr lang="en-US" dirty="0"/>
+              <a:t>Spring Security is a framework that </a:t>
+            </a:r>
+            <a:r>
+              <a:rPr lang="en-US" dirty="0" smtClean="0"/>
+              <a:t>provides:</a:t>
+            </a:r>
+          </a:p>
+          <a:p>
+            <a:pPr lvl="1">
+              <a:lnSpc>
+                <a:spcPct val="150000"/>
+              </a:lnSpc>
+              <a:buFont typeface="Arial" panose="020B0604020202020204" pitchFamily="34" charset="0"/>
+              <a:buChar char="•"/>
+            </a:pPr>
+            <a:r>
+              <a:rPr lang="en-US" dirty="0"/>
+              <a:t>Comprehensive and extensible support for both Authentication and Authorization</a:t>
+            </a:r>
+          </a:p>
+          <a:p>
+            <a:pPr lvl="1">
+              <a:lnSpc>
+                <a:spcPct val="150000"/>
+              </a:lnSpc>
+              <a:buFont typeface="Arial" panose="020B0604020202020204" pitchFamily="34" charset="0"/>
+              <a:buChar char="•"/>
+            </a:pPr>
+            <a:r>
+              <a:rPr lang="en-US" dirty="0"/>
+              <a:t>Protection against attacks like session fixation, clickjacking, cross site request forgery, </a:t>
+            </a:r>
+            <a:r>
+              <a:rPr lang="en-US" dirty="0" err="1"/>
+              <a:t>etc</a:t>
+            </a:r>
+            <a:endParaRPr lang="en-US" dirty="0"/>
+          </a:p>
+          <a:p>
+            <a:pPr lvl="1">
+              <a:lnSpc>
+                <a:spcPct val="150000"/>
+              </a:lnSpc>
+              <a:buFont typeface="Arial" panose="020B0604020202020204" pitchFamily="34" charset="0"/>
+              <a:buChar char="•"/>
+            </a:pPr>
+            <a:r>
+              <a:rPr lang="en-US" dirty="0"/>
+              <a:t>Servlet API integration</a:t>
+            </a:r>
+          </a:p>
+          <a:p>
+            <a:pPr lvl="1">
+              <a:lnSpc>
+                <a:spcPct val="150000"/>
+              </a:lnSpc>
+              <a:buFont typeface="Arial" panose="020B0604020202020204" pitchFamily="34" charset="0"/>
+              <a:buChar char="•"/>
+            </a:pPr>
+            <a:r>
+              <a:rPr lang="en-US" dirty="0"/>
+              <a:t>Optional integration with Spring Web MVC</a:t>
+            </a:r>
+          </a:p>
+          <a:p>
+            <a:pPr lvl="1"/>
+            <a:endParaRPr lang="en-US" dirty="0"/>
+          </a:p>
+        </p:txBody>
+      </p:sp>
+    </p:spTree>
+    <p:extLst>
+      <p:ext uri="{BB962C8B-B14F-4D97-AF65-F5344CB8AC3E}">
+        <p14:creationId xmlns:p14="http://schemas.microsoft.com/office/powerpoint/2010/main" val="444809840"/>
+      </p:ext>
+    </p:extLst>
+  </p:cSld>
+  <p:clrMapOvr>
+    <a:masterClrMapping/>
+  </p:clrMapOvr>
+  <mc:AlternateContent xmlns:mc="http://schemas.openxmlformats.org/markup-compatibility/2006" xmlns:p14="http://schemas.microsoft.com/office/powerpoint/2010/main">
+    <mc:Choice Requires="p14">
+      <p:transition spd="med" p14:dur="700">
+        <p:fade/>
+      </p:transition>
+    </mc:Choice>
+    <mc:Fallback xmlns="">
+      <p:transition spd="med">
+        <p:fade/>
+      </p:transition>
+    </mc:Fallback>
+  </mc:AlternateContent>
+</p:sld>
+</file>
+
+<file path=ppt/slides/slide19.xml><?xml version="1.0" encoding="utf-8"?>
+<p:sld xmlns:a="http://schemas.openxmlformats.org/drawingml/2006/main" xmlns:r="http://schemas.openxmlformats.org/officeDocument/2006/relationships" xmlns:p="http://schemas.openxmlformats.org/presentationml/2006/main">
+  <p:cSld>
+    <p:spTree>
+      <p:nvGrpSpPr>
+        <p:cNvPr id="1" name=""/>
+        <p:cNvGrpSpPr/>
+        <p:nvPr/>
+      </p:nvGrpSpPr>
+      <p:grpSpPr>
+        <a:xfrm>
+          <a:off x="0" y="0"/>
+          <a:ext cx="0" cy="0"/>
+          <a:chOff x="0" y="0"/>
+          <a:chExt cx="0" cy="0"/>
+        </a:xfrm>
+      </p:grpSpPr>
+      <p:sp>
+        <p:nvSpPr>
+          <p:cNvPr id="2" name="Title 1"/>
+          <p:cNvSpPr>
+            <a:spLocks noGrp="1"/>
+          </p:cNvSpPr>
+          <p:nvPr>
+            <p:ph type="title"/>
+          </p:nvPr>
+        </p:nvSpPr>
+        <p:spPr/>
+        <p:txBody>
+          <a:bodyPr/>
+          <a:lstStyle/>
+          <a:p>
+            <a:r>
               <a:rPr lang="en-US" dirty="0" smtClean="0"/>
               <a:t>Spring Boot</a:t>
             </a:r>
@@ -8518,13 +8706,13 @@
   <p:clrMapOvr>
     <a:masterClrMapping/>
   </p:clrMapOvr>
-  <mc:AlternateContent xmlns:mc="http://schemas.openxmlformats.org/markup-compatibility/2006">
-    <mc:Choice xmlns:p14="http://schemas.microsoft.com/office/powerpoint/2010/main" Requires="p14">
+  <mc:AlternateContent xmlns:mc="http://schemas.openxmlformats.org/markup-compatibility/2006" xmlns:p14="http://schemas.microsoft.com/office/powerpoint/2010/main">
+    <mc:Choice Requires="p14">
       <p:transition spd="med" p14:dur="700">
         <p:fade/>
       </p:transition>
     </mc:Choice>
-    <mc:Fallback>
+    <mc:Fallback xmlns="">
       <p:transition spd="med">
         <p:fade/>
       </p:transition>
@@ -8601,14 +8789,12 @@
               <a:rPr lang="en-US" dirty="0" smtClean="0"/>
               <a:t>History of Spring</a:t>
             </a:r>
-            <a:endParaRPr lang="en-US" dirty="0" smtClean="0"/>
           </a:p>
           <a:p>
             <a:r>
               <a:rPr lang="en-US" dirty="0" smtClean="0"/>
               <a:t>What is Spring?</a:t>
             </a:r>
-            <a:endParaRPr lang="en-US" dirty="0" smtClean="0"/>
           </a:p>
           <a:p>
             <a:r>
@@ -8865,13 +9051,13 @@
   <p:clrMapOvr>
     <a:masterClrMapping/>
   </p:clrMapOvr>
-  <mc:AlternateContent xmlns:mc="http://schemas.openxmlformats.org/markup-compatibility/2006">
-    <mc:Choice xmlns:p14="http://schemas.microsoft.com/office/powerpoint/2010/main" Requires="p14">
+  <mc:AlternateContent xmlns:mc="http://schemas.openxmlformats.org/markup-compatibility/2006" xmlns:p14="http://schemas.microsoft.com/office/powerpoint/2010/main">
+    <mc:Choice Requires="p14">
       <p:transition spd="med" p14:dur="700">
         <p:fade/>
       </p:transition>
     </mc:Choice>
-    <mc:Fallback>
+    <mc:Fallback xmlns="">
       <p:transition spd="med">
         <p:fade/>
       </p:transition>
@@ -9000,13 +9186,13 @@
   <p:clrMapOvr>
     <a:masterClrMapping/>
   </p:clrMapOvr>
-  <mc:AlternateContent xmlns:mc="http://schemas.openxmlformats.org/markup-compatibility/2006">
-    <mc:Choice xmlns:p14="http://schemas.microsoft.com/office/powerpoint/2010/main" Requires="p14">
+  <mc:AlternateContent xmlns:mc="http://schemas.openxmlformats.org/markup-compatibility/2006" xmlns:p14="http://schemas.microsoft.com/office/powerpoint/2010/main">
+    <mc:Choice Requires="p14">
       <p:transition spd="med" p14:dur="700">
         <p:fade/>
       </p:transition>
     </mc:Choice>
-    <mc:Fallback>
+    <mc:Fallback xmlns="">
       <p:transition spd="med">
         <p:fade/>
       </p:transition>
@@ -9210,28 +9396,7 @@
                     </a:outerShdw>
                   </a:effectLst>
                 </a:rPr>
-                <a:t>Data Access</a:t>
-              </a:r>
-              <a:r>
-                <a:rPr lang="en-US" b="1" dirty="0" smtClean="0">
-                  <a:ln w="10160">
-                    <a:solidFill>
-                      <a:schemeClr val="bg1"/>
-                    </a:solidFill>
-                    <a:prstDash val="solid"/>
-                  </a:ln>
-                  <a:solidFill>
-                    <a:srgbClr val="FFFFFF"/>
-                  </a:solidFill>
-                  <a:effectLst>
-                    <a:outerShdw blurRad="38100" dist="22860" dir="5400000" algn="tl" rotWithShape="0">
-                      <a:srgbClr val="000000">
-                        <a:alpha val="30000"/>
-                      </a:srgbClr>
-                    </a:outerShdw>
-                  </a:effectLst>
-                </a:rPr>
-                <a:t>/Integration</a:t>
+                <a:t>Data Access/Integration</a:t>
               </a:r>
               <a:endParaRPr lang="en-US" b="1" dirty="0">
                 <a:ln w="10160">
@@ -9294,7 +9459,6 @@
                 <a:rPr lang="en-US" dirty="0"/>
                 <a:t>JDBC</a:t>
               </a:r>
-              <a:endParaRPr lang="en-US" dirty="0"/>
             </a:p>
           </p:txBody>
         </p:sp>
@@ -9338,7 +9502,6 @@
                 <a:rPr lang="en-US" dirty="0"/>
                 <a:t>ORM</a:t>
               </a:r>
-              <a:endParaRPr lang="en-US" dirty="0"/>
             </a:p>
           </p:txBody>
         </p:sp>
@@ -9382,7 +9545,6 @@
                 <a:rPr lang="en-US" dirty="0"/>
                 <a:t>OXM</a:t>
               </a:r>
-              <a:endParaRPr lang="en-US" dirty="0"/>
             </a:p>
           </p:txBody>
         </p:sp>
@@ -9426,7 +9588,6 @@
                 <a:rPr lang="en-US" dirty="0"/>
                 <a:t>JMS</a:t>
               </a:r>
-              <a:endParaRPr lang="en-US" dirty="0"/>
             </a:p>
           </p:txBody>
         </p:sp>
@@ -9470,7 +9631,6 @@
                 <a:rPr lang="en-US" dirty="0"/>
                 <a:t>Transactions</a:t>
               </a:r>
-              <a:endParaRPr lang="en-US" dirty="0"/>
             </a:p>
           </p:txBody>
         </p:sp>
@@ -9821,7 +9981,6 @@
               <a:rPr lang="en-US" dirty="0"/>
               <a:t>AOP</a:t>
             </a:r>
-            <a:endParaRPr lang="en-US" dirty="0"/>
           </a:p>
         </p:txBody>
       </p:sp>
@@ -9868,7 +10027,6 @@
               <a:rPr lang="en-US" dirty="0"/>
               <a:t>Aspects</a:t>
             </a:r>
-            <a:endParaRPr lang="en-US" dirty="0"/>
           </a:p>
         </p:txBody>
       </p:sp>
@@ -9915,7 +10073,6 @@
               <a:rPr lang="en-US" dirty="0"/>
               <a:t>Instrumentation</a:t>
             </a:r>
-            <a:endParaRPr lang="en-US" dirty="0"/>
           </a:p>
         </p:txBody>
       </p:sp>
@@ -9962,7 +10119,6 @@
               <a:rPr lang="en-US" dirty="0"/>
               <a:t>Web</a:t>
             </a:r>
-            <a:endParaRPr lang="en-US" dirty="0"/>
           </a:p>
         </p:txBody>
       </p:sp>
@@ -10326,13 +10482,13 @@
   <p:clrMapOvr>
     <a:masterClrMapping/>
   </p:clrMapOvr>
-  <mc:AlternateContent xmlns:mc="http://schemas.openxmlformats.org/markup-compatibility/2006">
-    <mc:Choice xmlns:p14="http://schemas.microsoft.com/office/powerpoint/2010/main" Requires="p14">
+  <mc:AlternateContent xmlns:mc="http://schemas.openxmlformats.org/markup-compatibility/2006" xmlns:p14="http://schemas.microsoft.com/office/powerpoint/2010/main">
+    <mc:Choice Requires="p14">
       <p:transition spd="med" p14:dur="700">
         <p:fade/>
       </p:transition>
     </mc:Choice>
-    <mc:Fallback>
+    <mc:Fallback xmlns="">
       <p:transition spd="med">
         <p:fade/>
       </p:transition>
@@ -10543,13 +10699,13 @@
   <p:clrMapOvr>
     <a:masterClrMapping/>
   </p:clrMapOvr>
-  <mc:AlternateContent xmlns:mc="http://schemas.openxmlformats.org/markup-compatibility/2006">
-    <mc:Choice xmlns:p14="http://schemas.microsoft.com/office/powerpoint/2010/main" Requires="p14">
+  <mc:AlternateContent xmlns:mc="http://schemas.openxmlformats.org/markup-compatibility/2006" xmlns:p14="http://schemas.microsoft.com/office/powerpoint/2010/main">
+    <mc:Choice Requires="p14">
       <p:transition spd="med" p14:dur="700">
         <p:fade/>
       </p:transition>
     </mc:Choice>
-    <mc:Fallback>
+    <mc:Fallback xmlns="">
       <p:transition spd="med">
         <p:fade/>
       </p:transition>
@@ -10750,13 +10906,13 @@
   <p:clrMapOvr>
     <a:masterClrMapping/>
   </p:clrMapOvr>
-  <mc:AlternateContent xmlns:mc="http://schemas.openxmlformats.org/markup-compatibility/2006">
-    <mc:Choice xmlns:p14="http://schemas.microsoft.com/office/powerpoint/2010/main" Requires="p14">
+  <mc:AlternateContent xmlns:mc="http://schemas.openxmlformats.org/markup-compatibility/2006" xmlns:p14="http://schemas.microsoft.com/office/powerpoint/2010/main">
+    <mc:Choice Requires="p14">
       <p:transition spd="med" p14:dur="700">
         <p:fade/>
       </p:transition>
     </mc:Choice>
-    <mc:Fallback>
+    <mc:Fallback xmlns="">
       <p:transition spd="med">
         <p:fade/>
       </p:transition>
@@ -10924,13 +11080,13 @@
   <p:clrMapOvr>
     <a:masterClrMapping/>
   </p:clrMapOvr>
-  <mc:AlternateContent xmlns:mc="http://schemas.openxmlformats.org/markup-compatibility/2006">
-    <mc:Choice xmlns:p14="http://schemas.microsoft.com/office/powerpoint/2010/main" Requires="p14">
+  <mc:AlternateContent xmlns:mc="http://schemas.openxmlformats.org/markup-compatibility/2006" xmlns:p14="http://schemas.microsoft.com/office/powerpoint/2010/main">
+    <mc:Choice Requires="p14">
       <p:transition spd="med" p14:dur="700">
         <p:fade/>
       </p:transition>
     </mc:Choice>
-    <mc:Fallback>
+    <mc:Fallback xmlns="">
       <p:transition spd="med">
         <p:fade/>
       </p:transition>
@@ -10999,7 +11155,7 @@
         <p:spPr/>
         <p:txBody>
           <a:bodyPr>
-            <a:normAutofit fontScale="92500" lnSpcReduction="10000"/>
+            <a:normAutofit/>
           </a:bodyPr>
           <a:lstStyle/>
           <a:p>
@@ -11031,27 +11187,24 @@
             </a:r>
             <a:r>
               <a:rPr lang="en-US" dirty="0" smtClean="0"/>
-              <a:t>Based on two main components :</a:t>
-            </a:r>
-          </a:p>
-          <a:p>
-            <a:pPr>
-              <a:lnSpc>
-                <a:spcPct val="150000"/>
-              </a:lnSpc>
-            </a:pPr>
+              <a:t>Based on </a:t>
+            </a:r>
+            <a:r>
+              <a:rPr lang="en-US" dirty="0" smtClean="0"/>
+              <a:t>:</a:t>
+            </a:r>
+            <a:r>
+              <a:rPr lang="en-US" dirty="0"/>
+              <a:t> </a:t>
+            </a:r>
             <a:r>
               <a:rPr lang="en-US" dirty="0" err="1" smtClean="0"/>
               <a:t>BeanFactory</a:t>
             </a:r>
-            <a:endParaRPr lang="en-US" dirty="0" smtClean="0"/>
-          </a:p>
-          <a:p>
-            <a:pPr>
-              <a:lnSpc>
-                <a:spcPct val="150000"/>
-              </a:lnSpc>
-            </a:pPr>
+            <a:r>
+              <a:rPr lang="en-US" dirty="0" smtClean="0"/>
+              <a:t>\</a:t>
+            </a:r>
             <a:r>
               <a:rPr lang="en-US" dirty="0" err="1" smtClean="0"/>
               <a:t>ApplicationContext</a:t>
@@ -11070,13 +11223,13 @@
   <p:clrMapOvr>
     <a:masterClrMapping/>
   </p:clrMapOvr>
-  <mc:AlternateContent xmlns:mc="http://schemas.openxmlformats.org/markup-compatibility/2006">
-    <mc:Choice xmlns:p14="http://schemas.microsoft.com/office/powerpoint/2010/main" Requires="p14">
+  <mc:AlternateContent xmlns:mc="http://schemas.openxmlformats.org/markup-compatibility/2006" xmlns:p14="http://schemas.microsoft.com/office/powerpoint/2010/main">
+    <mc:Choice Requires="p14">
       <p:transition spd="med" p14:dur="700">
         <p:fade/>
       </p:transition>
     </mc:Choice>
-    <mc:Fallback>
+    <mc:Fallback xmlns="">
       <p:transition spd="med">
         <p:fade/>
       </p:transition>

</xml_diff>